<commit_message>
translated handout and presentation for workshop 2 into english
</commit_message>
<xml_diff>
--- a/presentation/en/workshop2/workshop2-maze-vr_handout_en.pptx
+++ b/presentation/en/workshop2/workshop2-maze-vr_handout_en.pptx
@@ -210,7 +210,7 @@
           <a:p>
             <a:fld id="{AF46ECB1-4FF0-A44F-B8D5-789C93DC290F}" type="datetimeFigureOut">
               <a:rPr lang="de-DE" smtClean="0"/>
-              <a:t>08.02.2017</a:t>
+              <a:t>24.02.2017</a:t>
             </a:fld>
             <a:endParaRPr lang="de-DE"/>
           </a:p>
@@ -609,7 +609,7 @@
           <a:p>
             <a:fld id="{EEB0755A-CF30-D146-8D26-B2A5A92CA76D}" type="datetimeFigureOut">
               <a:rPr lang="de-DE" smtClean="0"/>
-              <a:t>08.02.2017</a:t>
+              <a:t>24.02.2017</a:t>
             </a:fld>
             <a:endParaRPr lang="de-DE"/>
           </a:p>
@@ -774,7 +774,7 @@
           <a:p>
             <a:fld id="{EEB0755A-CF30-D146-8D26-B2A5A92CA76D}" type="datetimeFigureOut">
               <a:rPr lang="de-DE" smtClean="0"/>
-              <a:t>08.02.2017</a:t>
+              <a:t>24.02.2017</a:t>
             </a:fld>
             <a:endParaRPr lang="de-DE"/>
           </a:p>
@@ -949,7 +949,7 @@
           <a:p>
             <a:fld id="{EEB0755A-CF30-D146-8D26-B2A5A92CA76D}" type="datetimeFigureOut">
               <a:rPr lang="de-DE" smtClean="0"/>
-              <a:t>08.02.2017</a:t>
+              <a:t>24.02.2017</a:t>
             </a:fld>
             <a:endParaRPr lang="de-DE"/>
           </a:p>
@@ -1114,7 +1114,7 @@
           <a:p>
             <a:fld id="{EEB0755A-CF30-D146-8D26-B2A5A92CA76D}" type="datetimeFigureOut">
               <a:rPr lang="de-DE" smtClean="0"/>
-              <a:t>08.02.2017</a:t>
+              <a:t>24.02.2017</a:t>
             </a:fld>
             <a:endParaRPr lang="de-DE"/>
           </a:p>
@@ -1353,7 +1353,7 @@
           <a:p>
             <a:fld id="{EEB0755A-CF30-D146-8D26-B2A5A92CA76D}" type="datetimeFigureOut">
               <a:rPr lang="de-DE" smtClean="0"/>
-              <a:t>08.02.2017</a:t>
+              <a:t>24.02.2017</a:t>
             </a:fld>
             <a:endParaRPr lang="de-DE"/>
           </a:p>
@@ -1580,7 +1580,7 @@
           <a:p>
             <a:fld id="{EEB0755A-CF30-D146-8D26-B2A5A92CA76D}" type="datetimeFigureOut">
               <a:rPr lang="de-DE" smtClean="0"/>
-              <a:t>08.02.2017</a:t>
+              <a:t>24.02.2017</a:t>
             </a:fld>
             <a:endParaRPr lang="de-DE"/>
           </a:p>
@@ -1942,7 +1942,7 @@
           <a:p>
             <a:fld id="{EEB0755A-CF30-D146-8D26-B2A5A92CA76D}" type="datetimeFigureOut">
               <a:rPr lang="de-DE" smtClean="0"/>
-              <a:t>08.02.2017</a:t>
+              <a:t>24.02.2017</a:t>
             </a:fld>
             <a:endParaRPr lang="de-DE"/>
           </a:p>
@@ -2055,7 +2055,7 @@
           <a:p>
             <a:fld id="{EEB0755A-CF30-D146-8D26-B2A5A92CA76D}" type="datetimeFigureOut">
               <a:rPr lang="de-DE" smtClean="0"/>
-              <a:t>08.02.2017</a:t>
+              <a:t>24.02.2017</a:t>
             </a:fld>
             <a:endParaRPr lang="de-DE"/>
           </a:p>
@@ -2145,7 +2145,7 @@
           <a:p>
             <a:fld id="{EEB0755A-CF30-D146-8D26-B2A5A92CA76D}" type="datetimeFigureOut">
               <a:rPr lang="de-DE" smtClean="0"/>
-              <a:t>08.02.2017</a:t>
+              <a:t>24.02.2017</a:t>
             </a:fld>
             <a:endParaRPr lang="de-DE"/>
           </a:p>
@@ -2417,7 +2417,7 @@
           <a:p>
             <a:fld id="{EEB0755A-CF30-D146-8D26-B2A5A92CA76D}" type="datetimeFigureOut">
               <a:rPr lang="de-DE" smtClean="0"/>
-              <a:t>08.02.2017</a:t>
+              <a:t>24.02.2017</a:t>
             </a:fld>
             <a:endParaRPr lang="de-DE"/>
           </a:p>
@@ -2669,7 +2669,7 @@
           <a:p>
             <a:fld id="{EEB0755A-CF30-D146-8D26-B2A5A92CA76D}" type="datetimeFigureOut">
               <a:rPr lang="de-DE" smtClean="0"/>
-              <a:t>08.02.2017</a:t>
+              <a:t>24.02.2017</a:t>
             </a:fld>
             <a:endParaRPr lang="de-DE"/>
           </a:p>
@@ -2877,7 +2877,7 @@
           <a:p>
             <a:fld id="{EEB0755A-CF30-D146-8D26-B2A5A92CA76D}" type="datetimeFigureOut">
               <a:rPr lang="de-DE" smtClean="0"/>
-              <a:t>08.02.2017</a:t>
+              <a:t>24.02.2017</a:t>
             </a:fld>
             <a:endParaRPr lang="de-DE"/>
           </a:p>
@@ -10024,12 +10024,6 @@
               </a:rPr>
               <a:t>';</a:t>
             </a:r>
-            <a:endParaRPr lang="de-DE" sz="1000" b="1" dirty="0">
-              <a:solidFill>
-                <a:srgbClr val="000000"/>
-              </a:solidFill>
-              <a:latin typeface="Monaco" charset="0"/>
-            </a:endParaRPr>
           </a:p>
           <a:p>
             <a:endParaRPr lang="de-DE" sz="1000" dirty="0">
@@ -10418,25 +10412,101 @@
                 </a:solidFill>
                 <a:latin typeface="Monaco" charset="0"/>
               </a:rPr>
-              <a:t>labyrinth</a:t>
-            </a:r>
-            <a:r>
-              <a:rPr lang="de-DE" sz="1000" dirty="0" err="1" smtClean="0">
+              <a:t>labyrinth.</a:t>
+            </a:r>
+            <a:r>
+              <a:rPr lang="de-DE" sz="1000" b="1" dirty="0" err="1" smtClean="0">
                 <a:solidFill>
                   <a:srgbClr val="000000"/>
                 </a:solidFill>
                 <a:latin typeface="Monaco" charset="0"/>
               </a:rPr>
-              <a:t>.</a:t>
+              <a:t>newWall</a:t>
+            </a:r>
+            <a:r>
+              <a:rPr lang="de-DE" sz="1000" b="1" dirty="0" smtClean="0">
+                <a:solidFill>
+                  <a:srgbClr val="000000"/>
+                </a:solidFill>
+                <a:latin typeface="Monaco" charset="0"/>
+              </a:rPr>
+              <a:t>(</a:t>
+            </a:r>
+            <a:r>
+              <a:rPr lang="de-DE" sz="1000" b="1" dirty="0" smtClean="0">
+                <a:solidFill>
+                  <a:srgbClr val="0000CF"/>
+                </a:solidFill>
+                <a:latin typeface="Monaco" charset="0"/>
+              </a:rPr>
+              <a:t>6</a:t>
+            </a:r>
+            <a:r>
+              <a:rPr lang="de-DE" sz="1000" b="1" dirty="0" smtClean="0">
+                <a:solidFill>
+                  <a:srgbClr val="000000"/>
+                </a:solidFill>
+                <a:latin typeface="Monaco" charset="0"/>
+              </a:rPr>
+              <a:t>, </a:t>
+            </a:r>
+            <a:r>
+              <a:rPr lang="de-DE" sz="1000" b="1" dirty="0" smtClean="0">
+                <a:solidFill>
+                  <a:srgbClr val="0000CF"/>
+                </a:solidFill>
+                <a:latin typeface="Monaco" charset="0"/>
+              </a:rPr>
+              <a:t>2</a:t>
+            </a:r>
+            <a:r>
+              <a:rPr lang="de-DE" sz="1000" b="1" dirty="0" smtClean="0">
+                <a:solidFill>
+                  <a:srgbClr val="000000"/>
+                </a:solidFill>
+                <a:latin typeface="Monaco" charset="0"/>
+              </a:rPr>
+              <a:t>, </a:t>
+            </a:r>
+            <a:r>
+              <a:rPr lang="de-DE" sz="1000" b="1" dirty="0" smtClean="0">
+                <a:solidFill>
+                  <a:srgbClr val="4E9A06"/>
+                </a:solidFill>
+                <a:latin typeface="Monaco" charset="0"/>
+              </a:rPr>
+              <a:t>'</a:t>
             </a:r>
             <a:r>
               <a:rPr lang="de-DE" sz="1000" b="1" dirty="0" err="1" smtClean="0">
                 <a:solidFill>
+                  <a:srgbClr val="4E9A06"/>
+                </a:solidFill>
+                <a:latin typeface="Monaco" charset="0"/>
+              </a:rPr>
+              <a:t>ríght</a:t>
+            </a:r>
+            <a:r>
+              <a:rPr lang="de-DE" sz="1000" b="1" dirty="0" smtClean="0">
+                <a:solidFill>
+                  <a:srgbClr val="4E9A06"/>
+                </a:solidFill>
+                <a:latin typeface="Monaco" charset="0"/>
+              </a:rPr>
+              <a:t>'</a:t>
+            </a:r>
+            <a:r>
+              <a:rPr lang="de-DE" sz="1000" b="1" dirty="0" smtClean="0">
+                <a:solidFill>
                   <a:srgbClr val="000000"/>
                 </a:solidFill>
                 <a:latin typeface="Monaco" charset="0"/>
               </a:rPr>
-              <a:t>newWall</a:t>
+              <a:t>, </a:t>
+            </a:r>
+            <a:r>
+              <a:rPr lang="en-US" sz="1000" dirty="0"/>
+              <a:t>Texture</a:t>
             </a:r>
             <a:r>
               <a:rPr lang="de-DE" sz="1000" b="1" dirty="0" smtClean="0">
@@ -10445,113 +10515,17 @@
                 </a:solidFill>
                 <a:latin typeface="Monaco" charset="0"/>
               </a:rPr>
-              <a:t>(</a:t>
+              <a:t>.HEDGE</a:t>
             </a:r>
             <a:r>
               <a:rPr lang="de-DE" sz="1000" b="1" dirty="0" smtClean="0">
                 <a:solidFill>
-                  <a:srgbClr val="0000CF"/>
+                  <a:srgbClr val="000000"/>
                 </a:solidFill>
                 <a:latin typeface="Monaco" charset="0"/>
               </a:rPr>
-              <a:t>6</a:t>
-            </a:r>
-            <a:r>
-              <a:rPr lang="de-DE" sz="1000" b="1" dirty="0" smtClean="0">
-                <a:solidFill>
-                  <a:srgbClr val="000000"/>
-                </a:solidFill>
-                <a:latin typeface="Monaco" charset="0"/>
-              </a:rPr>
-              <a:t>, </a:t>
-            </a:r>
-            <a:r>
-              <a:rPr lang="de-DE" sz="1000" b="1" dirty="0" smtClean="0">
-                <a:solidFill>
-                  <a:srgbClr val="0000CF"/>
-                </a:solidFill>
-                <a:latin typeface="Monaco" charset="0"/>
-              </a:rPr>
-              <a:t>2</a:t>
-            </a:r>
-            <a:r>
-              <a:rPr lang="de-DE" sz="1000" b="1" dirty="0" smtClean="0">
-                <a:solidFill>
-                  <a:srgbClr val="000000"/>
-                </a:solidFill>
-                <a:latin typeface="Monaco" charset="0"/>
-              </a:rPr>
-              <a:t>, </a:t>
-            </a:r>
-            <a:r>
-              <a:rPr lang="de-DE" sz="1000" b="1" dirty="0" smtClean="0">
-                <a:solidFill>
-                  <a:srgbClr val="4E9A06"/>
-                </a:solidFill>
-                <a:latin typeface="Monaco" charset="0"/>
-              </a:rPr>
-              <a:t>'</a:t>
-            </a:r>
-            <a:r>
-              <a:rPr lang="de-DE" sz="1000" b="1" dirty="0" err="1" smtClean="0">
-                <a:solidFill>
-                  <a:srgbClr val="4E9A06"/>
-                </a:solidFill>
-                <a:latin typeface="Monaco" charset="0"/>
-              </a:rPr>
-              <a:t>ríght</a:t>
-            </a:r>
-            <a:r>
-              <a:rPr lang="de-DE" sz="1000" b="1" dirty="0" smtClean="0">
-                <a:solidFill>
-                  <a:srgbClr val="4E9A06"/>
-                </a:solidFill>
-                <a:latin typeface="Monaco" charset="0"/>
-              </a:rPr>
-              <a:t>'</a:t>
-            </a:r>
-            <a:r>
-              <a:rPr lang="de-DE" sz="1000" b="1" dirty="0" smtClean="0">
-                <a:solidFill>
-                  <a:srgbClr val="000000"/>
-                </a:solidFill>
-                <a:latin typeface="Monaco" charset="0"/>
-              </a:rPr>
-              <a:t>, </a:t>
-            </a:r>
-            <a:r>
-              <a:rPr lang="de-DE" sz="1000" dirty="0" err="1" smtClean="0">
-                <a:solidFill>
-                  <a:srgbClr val="000000"/>
-                </a:solidFill>
-                <a:latin typeface="Monaco" charset="0"/>
-              </a:rPr>
-              <a:t>Muster</a:t>
-            </a:r>
-            <a:r>
-              <a:rPr lang="de-DE" sz="1000" b="1" dirty="0" err="1" smtClean="0">
-                <a:solidFill>
-                  <a:srgbClr val="000000"/>
-                </a:solidFill>
-                <a:latin typeface="Monaco" charset="0"/>
-              </a:rPr>
-              <a:t>.HEDGE</a:t>
-            </a:r>
-            <a:r>
-              <a:rPr lang="de-DE" sz="1000" b="1" dirty="0" smtClean="0">
-                <a:solidFill>
-                  <a:srgbClr val="000000"/>
-                </a:solidFill>
-                <a:latin typeface="Monaco" charset="0"/>
-              </a:rPr>
               <a:t>);</a:t>
             </a:r>
-            <a:endParaRPr lang="de-DE" sz="1000" b="1" dirty="0" smtClean="0">
-              <a:solidFill>
-                <a:srgbClr val="000000"/>
-              </a:solidFill>
-              <a:latin typeface="Monaco" charset="0"/>
-            </a:endParaRPr>
           </a:p>
           <a:p>
             <a:r>
@@ -10975,16 +10949,25 @@
               <a:t>, </a:t>
             </a:r>
             <a:r>
-              <a:rPr lang="de-DE" sz="1000" b="1" dirty="0">
+              <a:rPr lang="de-DE" sz="1000" b="1" dirty="0" err="1" smtClean="0">
                 <a:solidFill>
                   <a:srgbClr val="4E9A06"/>
                 </a:solidFill>
                 <a:latin typeface="Monaco" charset="0"/>
               </a:rPr>
-              <a:t>'Beschleuniger'</a:t>
-            </a:r>
-            <a:r>
-              <a:rPr lang="de-DE" sz="1000" b="1" dirty="0">
+              <a:t>Accelerator</a:t>
+            </a:r>
+            <a:r>
+              <a:rPr lang="de-DE" sz="1000" b="1" dirty="0" smtClean="0">
+                <a:solidFill>
+                  <a:srgbClr val="4E9A06"/>
+                </a:solidFill>
+                <a:latin typeface="Monaco" charset="0"/>
+              </a:rPr>
+              <a:t>'</a:t>
+            </a:r>
+            <a:r>
+              <a:rPr lang="de-DE" sz="1000" b="1" dirty="0" smtClean="0">
                 <a:solidFill>
                   <a:srgbClr val="000000"/>
                 </a:solidFill>
@@ -10992,6 +10975,12 @@
               </a:rPr>
               <a:t>)</a:t>
             </a:r>
+            <a:endParaRPr lang="de-DE" sz="1000" b="1" dirty="0">
+              <a:solidFill>
+                <a:srgbClr val="000000"/>
+              </a:solidFill>
+              <a:latin typeface="Monaco" charset="0"/>
+            </a:endParaRPr>
           </a:p>
           <a:p>
             <a:r>
@@ -11692,12 +11681,6 @@
               </a:rPr>
               <a:t>);</a:t>
             </a:r>
-            <a:endParaRPr lang="de-DE" sz="1000" b="1" dirty="0">
-              <a:solidFill>
-                <a:srgbClr val="000000"/>
-              </a:solidFill>
-              <a:latin typeface="Monaco" charset="0"/>
-            </a:endParaRPr>
           </a:p>
           <a:p>
             <a:endParaRPr lang="de-DE" sz="1000" dirty="0">
@@ -19867,14 +19850,6 @@
               </a:rPr>
               <a:t> fast “</a:t>
             </a:r>
-            <a:endParaRPr lang="de-DE" sz="800" dirty="0">
-              <a:solidFill>
-                <a:srgbClr val="C00000"/>
-              </a:solidFill>
-              <a:latin typeface="Segoe Print" charset="0"/>
-              <a:ea typeface="Segoe Print" charset="0"/>
-              <a:cs typeface="Segoe Print" charset="0"/>
-            </a:endParaRPr>
           </a:p>
         </p:txBody>
       </p:sp>

</xml_diff>

<commit_message>
added info to keep image size below 100Kbytes
</commit_message>
<xml_diff>
--- a/presentation/en/workshop2/workshop2-maze-vr_handout_en.pptx
+++ b/presentation/en/workshop2/workshop2-maze-vr_handout_en.pptx
@@ -210,7 +210,7 @@
           <a:p>
             <a:fld id="{AF46ECB1-4FF0-A44F-B8D5-789C93DC290F}" type="datetimeFigureOut">
               <a:rPr lang="de-DE" smtClean="0"/>
-              <a:t>24.02.2017</a:t>
+              <a:t>30.04.18</a:t>
             </a:fld>
             <a:endParaRPr lang="de-DE"/>
           </a:p>
@@ -369,7 +369,7 @@
           <a:p>
             <a:fld id="{0EDBF13D-84D8-6A44-83D4-9EE6677431F7}" type="slidenum">
               <a:rPr lang="de-DE" smtClean="0"/>
-              <a:t>‹Nr.›</a:t>
+              <a:t>‹#›</a:t>
             </a:fld>
             <a:endParaRPr lang="de-DE"/>
           </a:p>
@@ -609,7 +609,7 @@
           <a:p>
             <a:fld id="{EEB0755A-CF30-D146-8D26-B2A5A92CA76D}" type="datetimeFigureOut">
               <a:rPr lang="de-DE" smtClean="0"/>
-              <a:t>24.02.2017</a:t>
+              <a:t>30.04.18</a:t>
             </a:fld>
             <a:endParaRPr lang="de-DE"/>
           </a:p>
@@ -651,7 +651,7 @@
           <a:p>
             <a:fld id="{636A27B1-28FF-9346-9954-1945AF7FD071}" type="slidenum">
               <a:rPr lang="de-DE" smtClean="0"/>
-              <a:t>‹Nr.›</a:t>
+              <a:t>‹#›</a:t>
             </a:fld>
             <a:endParaRPr lang="de-DE"/>
           </a:p>
@@ -774,7 +774,7 @@
           <a:p>
             <a:fld id="{EEB0755A-CF30-D146-8D26-B2A5A92CA76D}" type="datetimeFigureOut">
               <a:rPr lang="de-DE" smtClean="0"/>
-              <a:t>24.02.2017</a:t>
+              <a:t>30.04.18</a:t>
             </a:fld>
             <a:endParaRPr lang="de-DE"/>
           </a:p>
@@ -816,7 +816,7 @@
           <a:p>
             <a:fld id="{636A27B1-28FF-9346-9954-1945AF7FD071}" type="slidenum">
               <a:rPr lang="de-DE" smtClean="0"/>
-              <a:t>‹Nr.›</a:t>
+              <a:t>‹#›</a:t>
             </a:fld>
             <a:endParaRPr lang="de-DE"/>
           </a:p>
@@ -949,7 +949,7 @@
           <a:p>
             <a:fld id="{EEB0755A-CF30-D146-8D26-B2A5A92CA76D}" type="datetimeFigureOut">
               <a:rPr lang="de-DE" smtClean="0"/>
-              <a:t>24.02.2017</a:t>
+              <a:t>30.04.18</a:t>
             </a:fld>
             <a:endParaRPr lang="de-DE"/>
           </a:p>
@@ -991,7 +991,7 @@
           <a:p>
             <a:fld id="{636A27B1-28FF-9346-9954-1945AF7FD071}" type="slidenum">
               <a:rPr lang="de-DE" smtClean="0"/>
-              <a:t>‹Nr.›</a:t>
+              <a:t>‹#›</a:t>
             </a:fld>
             <a:endParaRPr lang="de-DE"/>
           </a:p>
@@ -1114,7 +1114,7 @@
           <a:p>
             <a:fld id="{EEB0755A-CF30-D146-8D26-B2A5A92CA76D}" type="datetimeFigureOut">
               <a:rPr lang="de-DE" smtClean="0"/>
-              <a:t>24.02.2017</a:t>
+              <a:t>30.04.18</a:t>
             </a:fld>
             <a:endParaRPr lang="de-DE"/>
           </a:p>
@@ -1156,7 +1156,7 @@
           <a:p>
             <a:fld id="{636A27B1-28FF-9346-9954-1945AF7FD071}" type="slidenum">
               <a:rPr lang="de-DE" smtClean="0"/>
-              <a:t>‹Nr.›</a:t>
+              <a:t>‹#›</a:t>
             </a:fld>
             <a:endParaRPr lang="de-DE"/>
           </a:p>
@@ -1353,7 +1353,7 @@
           <a:p>
             <a:fld id="{EEB0755A-CF30-D146-8D26-B2A5A92CA76D}" type="datetimeFigureOut">
               <a:rPr lang="de-DE" smtClean="0"/>
-              <a:t>24.02.2017</a:t>
+              <a:t>30.04.18</a:t>
             </a:fld>
             <a:endParaRPr lang="de-DE"/>
           </a:p>
@@ -1395,7 +1395,7 @@
           <a:p>
             <a:fld id="{636A27B1-28FF-9346-9954-1945AF7FD071}" type="slidenum">
               <a:rPr lang="de-DE" smtClean="0"/>
-              <a:t>‹Nr.›</a:t>
+              <a:t>‹#›</a:t>
             </a:fld>
             <a:endParaRPr lang="de-DE"/>
           </a:p>
@@ -1580,7 +1580,7 @@
           <a:p>
             <a:fld id="{EEB0755A-CF30-D146-8D26-B2A5A92CA76D}" type="datetimeFigureOut">
               <a:rPr lang="de-DE" smtClean="0"/>
-              <a:t>24.02.2017</a:t>
+              <a:t>30.04.18</a:t>
             </a:fld>
             <a:endParaRPr lang="de-DE"/>
           </a:p>
@@ -1622,7 +1622,7 @@
           <a:p>
             <a:fld id="{636A27B1-28FF-9346-9954-1945AF7FD071}" type="slidenum">
               <a:rPr lang="de-DE" smtClean="0"/>
-              <a:t>‹Nr.›</a:t>
+              <a:t>‹#›</a:t>
             </a:fld>
             <a:endParaRPr lang="de-DE"/>
           </a:p>
@@ -1942,7 +1942,7 @@
           <a:p>
             <a:fld id="{EEB0755A-CF30-D146-8D26-B2A5A92CA76D}" type="datetimeFigureOut">
               <a:rPr lang="de-DE" smtClean="0"/>
-              <a:t>24.02.2017</a:t>
+              <a:t>30.04.18</a:t>
             </a:fld>
             <a:endParaRPr lang="de-DE"/>
           </a:p>
@@ -1984,7 +1984,7 @@
           <a:p>
             <a:fld id="{636A27B1-28FF-9346-9954-1945AF7FD071}" type="slidenum">
               <a:rPr lang="de-DE" smtClean="0"/>
-              <a:t>‹Nr.›</a:t>
+              <a:t>‹#›</a:t>
             </a:fld>
             <a:endParaRPr lang="de-DE"/>
           </a:p>
@@ -2055,7 +2055,7 @@
           <a:p>
             <a:fld id="{EEB0755A-CF30-D146-8D26-B2A5A92CA76D}" type="datetimeFigureOut">
               <a:rPr lang="de-DE" smtClean="0"/>
-              <a:t>24.02.2017</a:t>
+              <a:t>30.04.18</a:t>
             </a:fld>
             <a:endParaRPr lang="de-DE"/>
           </a:p>
@@ -2097,7 +2097,7 @@
           <a:p>
             <a:fld id="{636A27B1-28FF-9346-9954-1945AF7FD071}" type="slidenum">
               <a:rPr lang="de-DE" smtClean="0"/>
-              <a:t>‹Nr.›</a:t>
+              <a:t>‹#›</a:t>
             </a:fld>
             <a:endParaRPr lang="de-DE"/>
           </a:p>
@@ -2145,7 +2145,7 @@
           <a:p>
             <a:fld id="{EEB0755A-CF30-D146-8D26-B2A5A92CA76D}" type="datetimeFigureOut">
               <a:rPr lang="de-DE" smtClean="0"/>
-              <a:t>24.02.2017</a:t>
+              <a:t>30.04.18</a:t>
             </a:fld>
             <a:endParaRPr lang="de-DE"/>
           </a:p>
@@ -2187,7 +2187,7 @@
           <a:p>
             <a:fld id="{636A27B1-28FF-9346-9954-1945AF7FD071}" type="slidenum">
               <a:rPr lang="de-DE" smtClean="0"/>
-              <a:t>‹Nr.›</a:t>
+              <a:t>‹#›</a:t>
             </a:fld>
             <a:endParaRPr lang="de-DE"/>
           </a:p>
@@ -2417,7 +2417,7 @@
           <a:p>
             <a:fld id="{EEB0755A-CF30-D146-8D26-B2A5A92CA76D}" type="datetimeFigureOut">
               <a:rPr lang="de-DE" smtClean="0"/>
-              <a:t>24.02.2017</a:t>
+              <a:t>30.04.18</a:t>
             </a:fld>
             <a:endParaRPr lang="de-DE"/>
           </a:p>
@@ -2459,7 +2459,7 @@
           <a:p>
             <a:fld id="{636A27B1-28FF-9346-9954-1945AF7FD071}" type="slidenum">
               <a:rPr lang="de-DE" smtClean="0"/>
-              <a:t>‹Nr.›</a:t>
+              <a:t>‹#›</a:t>
             </a:fld>
             <a:endParaRPr lang="de-DE"/>
           </a:p>
@@ -2669,7 +2669,7 @@
           <a:p>
             <a:fld id="{EEB0755A-CF30-D146-8D26-B2A5A92CA76D}" type="datetimeFigureOut">
               <a:rPr lang="de-DE" smtClean="0"/>
-              <a:t>24.02.2017</a:t>
+              <a:t>30.04.18</a:t>
             </a:fld>
             <a:endParaRPr lang="de-DE"/>
           </a:p>
@@ -2711,7 +2711,7 @@
           <a:p>
             <a:fld id="{636A27B1-28FF-9346-9954-1945AF7FD071}" type="slidenum">
               <a:rPr lang="de-DE" smtClean="0"/>
-              <a:t>‹Nr.›</a:t>
+              <a:t>‹#›</a:t>
             </a:fld>
             <a:endParaRPr lang="de-DE"/>
           </a:p>
@@ -2877,7 +2877,7 @@
           <a:p>
             <a:fld id="{EEB0755A-CF30-D146-8D26-B2A5A92CA76D}" type="datetimeFigureOut">
               <a:rPr lang="de-DE" smtClean="0"/>
-              <a:t>24.02.2017</a:t>
+              <a:t>30.04.18</a:t>
             </a:fld>
             <a:endParaRPr lang="de-DE"/>
           </a:p>
@@ -2955,7 +2955,7 @@
           <a:p>
             <a:fld id="{636A27B1-28FF-9346-9954-1945AF7FD071}" type="slidenum">
               <a:rPr lang="de-DE" smtClean="0"/>
-              <a:t>‹Nr.›</a:t>
+              <a:t>‹#›</a:t>
             </a:fld>
             <a:endParaRPr lang="de-DE"/>
           </a:p>
@@ -10515,16 +10515,7 @@
                 </a:solidFill>
                 <a:latin typeface="Monaco" charset="0"/>
               </a:rPr>
-              <a:t>.HEDGE</a:t>
-            </a:r>
-            <a:r>
-              <a:rPr lang="de-DE" sz="1000" b="1" dirty="0" smtClean="0">
-                <a:solidFill>
-                  <a:srgbClr val="000000"/>
-                </a:solidFill>
-                <a:latin typeface="Monaco" charset="0"/>
-              </a:rPr>
-              <a:t>);</a:t>
+              <a:t>.HEDGE);</a:t>
             </a:r>
           </a:p>
           <a:p>
@@ -20428,6 +20419,92 @@
           </a:fontRef>
         </p:style>
       </p:cxnSp>
+      <p:sp>
+        <p:nvSpPr>
+          <p:cNvPr id="9" name="TextBox 8"/>
+          <p:cNvSpPr txBox="1"/>
+          <p:nvPr/>
+        </p:nvSpPr>
+        <p:spPr>
+          <a:xfrm>
+            <a:off x="1520192" y="9536668"/>
+            <a:ext cx="5215980" cy="369332"/>
+          </a:xfrm>
+          <a:prstGeom prst="rect">
+            <a:avLst/>
+          </a:prstGeom>
+          <a:noFill/>
+        </p:spPr>
+        <p:txBody>
+          <a:bodyPr wrap="none" rtlCol="0">
+            <a:spAutoFit/>
+          </a:bodyPr>
+          <a:lstStyle/>
+          <a:p>
+            <a:r>
+              <a:rPr lang="de-DE" dirty="0" smtClean="0"/>
+              <a:t>Mentor-</a:t>
+            </a:r>
+            <a:r>
+              <a:rPr lang="de-DE" dirty="0" err="1" smtClean="0"/>
+              <a:t>Tip</a:t>
+            </a:r>
+            <a:r>
+              <a:rPr lang="de-DE" dirty="0" smtClean="0"/>
+              <a:t>: File </a:t>
+            </a:r>
+            <a:r>
+              <a:rPr lang="de-DE" dirty="0" err="1" smtClean="0"/>
+              <a:t>size</a:t>
+            </a:r>
+            <a:r>
+              <a:rPr lang="de-DE" dirty="0" smtClean="0"/>
+              <a:t> </a:t>
+            </a:r>
+            <a:r>
+              <a:rPr lang="de-DE" dirty="0" err="1" smtClean="0"/>
+              <a:t>should</a:t>
+            </a:r>
+            <a:r>
+              <a:rPr lang="de-DE" dirty="0" smtClean="0"/>
+              <a:t> </a:t>
+            </a:r>
+            <a:r>
+              <a:rPr lang="de-DE" dirty="0" err="1" smtClean="0"/>
+              <a:t>bel</a:t>
+            </a:r>
+            <a:r>
+              <a:rPr lang="de-DE" dirty="0"/>
+              <a:t> </a:t>
+            </a:r>
+            <a:r>
+              <a:rPr lang="de-DE" dirty="0" err="1" smtClean="0"/>
+              <a:t>less</a:t>
+            </a:r>
+            <a:r>
+              <a:rPr lang="de-DE" dirty="0" smtClean="0"/>
+              <a:t> </a:t>
+            </a:r>
+            <a:r>
+              <a:rPr lang="de-DE" dirty="0" err="1" smtClean="0"/>
+              <a:t>than</a:t>
+            </a:r>
+            <a:r>
+              <a:rPr lang="de-DE" dirty="0" smtClean="0"/>
+              <a:t> </a:t>
+            </a:r>
+            <a:r>
+              <a:rPr lang="de-DE" dirty="0" smtClean="0"/>
+              <a:t>100 </a:t>
+            </a:r>
+            <a:r>
+              <a:rPr lang="de-DE" dirty="0" smtClean="0"/>
+              <a:t>Kilobyte</a:t>
+            </a:r>
+            <a:endParaRPr lang="de-DE" dirty="0"/>
+          </a:p>
+        </p:txBody>
+      </p:sp>
     </p:spTree>
     <p:extLst>
       <p:ext uri="{BB962C8B-B14F-4D97-AF65-F5344CB8AC3E}">

</xml_diff>

<commit_message>
added magnetometer support for google chrome only
</commit_message>
<xml_diff>
--- a/presentation/en/workshop2/workshop2-maze-vr_handout_en.pptx
+++ b/presentation/en/workshop2/workshop2-maze-vr_handout_en.pptx
@@ -210,7 +210,7 @@
           <a:p>
             <a:fld id="{AF46ECB1-4FF0-A44F-B8D5-789C93DC290F}" type="datetimeFigureOut">
               <a:rPr lang="de-DE" smtClean="0"/>
-              <a:t>24.02.2017</a:t>
+              <a:t>30.04.18</a:t>
             </a:fld>
             <a:endParaRPr lang="de-DE"/>
           </a:p>
@@ -369,7 +369,7 @@
           <a:p>
             <a:fld id="{0EDBF13D-84D8-6A44-83D4-9EE6677431F7}" type="slidenum">
               <a:rPr lang="de-DE" smtClean="0"/>
-              <a:t>‹Nr.›</a:t>
+              <a:t>‹#›</a:t>
             </a:fld>
             <a:endParaRPr lang="de-DE"/>
           </a:p>
@@ -609,7 +609,7 @@
           <a:p>
             <a:fld id="{EEB0755A-CF30-D146-8D26-B2A5A92CA76D}" type="datetimeFigureOut">
               <a:rPr lang="de-DE" smtClean="0"/>
-              <a:t>24.02.2017</a:t>
+              <a:t>30.04.18</a:t>
             </a:fld>
             <a:endParaRPr lang="de-DE"/>
           </a:p>
@@ -651,7 +651,7 @@
           <a:p>
             <a:fld id="{636A27B1-28FF-9346-9954-1945AF7FD071}" type="slidenum">
               <a:rPr lang="de-DE" smtClean="0"/>
-              <a:t>‹Nr.›</a:t>
+              <a:t>‹#›</a:t>
             </a:fld>
             <a:endParaRPr lang="de-DE"/>
           </a:p>
@@ -774,7 +774,7 @@
           <a:p>
             <a:fld id="{EEB0755A-CF30-D146-8D26-B2A5A92CA76D}" type="datetimeFigureOut">
               <a:rPr lang="de-DE" smtClean="0"/>
-              <a:t>24.02.2017</a:t>
+              <a:t>30.04.18</a:t>
             </a:fld>
             <a:endParaRPr lang="de-DE"/>
           </a:p>
@@ -816,7 +816,7 @@
           <a:p>
             <a:fld id="{636A27B1-28FF-9346-9954-1945AF7FD071}" type="slidenum">
               <a:rPr lang="de-DE" smtClean="0"/>
-              <a:t>‹Nr.›</a:t>
+              <a:t>‹#›</a:t>
             </a:fld>
             <a:endParaRPr lang="de-DE"/>
           </a:p>
@@ -949,7 +949,7 @@
           <a:p>
             <a:fld id="{EEB0755A-CF30-D146-8D26-B2A5A92CA76D}" type="datetimeFigureOut">
               <a:rPr lang="de-DE" smtClean="0"/>
-              <a:t>24.02.2017</a:t>
+              <a:t>30.04.18</a:t>
             </a:fld>
             <a:endParaRPr lang="de-DE"/>
           </a:p>
@@ -991,7 +991,7 @@
           <a:p>
             <a:fld id="{636A27B1-28FF-9346-9954-1945AF7FD071}" type="slidenum">
               <a:rPr lang="de-DE" smtClean="0"/>
-              <a:t>‹Nr.›</a:t>
+              <a:t>‹#›</a:t>
             </a:fld>
             <a:endParaRPr lang="de-DE"/>
           </a:p>
@@ -1114,7 +1114,7 @@
           <a:p>
             <a:fld id="{EEB0755A-CF30-D146-8D26-B2A5A92CA76D}" type="datetimeFigureOut">
               <a:rPr lang="de-DE" smtClean="0"/>
-              <a:t>24.02.2017</a:t>
+              <a:t>30.04.18</a:t>
             </a:fld>
             <a:endParaRPr lang="de-DE"/>
           </a:p>
@@ -1156,7 +1156,7 @@
           <a:p>
             <a:fld id="{636A27B1-28FF-9346-9954-1945AF7FD071}" type="slidenum">
               <a:rPr lang="de-DE" smtClean="0"/>
-              <a:t>‹Nr.›</a:t>
+              <a:t>‹#›</a:t>
             </a:fld>
             <a:endParaRPr lang="de-DE"/>
           </a:p>
@@ -1353,7 +1353,7 @@
           <a:p>
             <a:fld id="{EEB0755A-CF30-D146-8D26-B2A5A92CA76D}" type="datetimeFigureOut">
               <a:rPr lang="de-DE" smtClean="0"/>
-              <a:t>24.02.2017</a:t>
+              <a:t>30.04.18</a:t>
             </a:fld>
             <a:endParaRPr lang="de-DE"/>
           </a:p>
@@ -1395,7 +1395,7 @@
           <a:p>
             <a:fld id="{636A27B1-28FF-9346-9954-1945AF7FD071}" type="slidenum">
               <a:rPr lang="de-DE" smtClean="0"/>
-              <a:t>‹Nr.›</a:t>
+              <a:t>‹#›</a:t>
             </a:fld>
             <a:endParaRPr lang="de-DE"/>
           </a:p>
@@ -1580,7 +1580,7 @@
           <a:p>
             <a:fld id="{EEB0755A-CF30-D146-8D26-B2A5A92CA76D}" type="datetimeFigureOut">
               <a:rPr lang="de-DE" smtClean="0"/>
-              <a:t>24.02.2017</a:t>
+              <a:t>30.04.18</a:t>
             </a:fld>
             <a:endParaRPr lang="de-DE"/>
           </a:p>
@@ -1622,7 +1622,7 @@
           <a:p>
             <a:fld id="{636A27B1-28FF-9346-9954-1945AF7FD071}" type="slidenum">
               <a:rPr lang="de-DE" smtClean="0"/>
-              <a:t>‹Nr.›</a:t>
+              <a:t>‹#›</a:t>
             </a:fld>
             <a:endParaRPr lang="de-DE"/>
           </a:p>
@@ -1942,7 +1942,7 @@
           <a:p>
             <a:fld id="{EEB0755A-CF30-D146-8D26-B2A5A92CA76D}" type="datetimeFigureOut">
               <a:rPr lang="de-DE" smtClean="0"/>
-              <a:t>24.02.2017</a:t>
+              <a:t>30.04.18</a:t>
             </a:fld>
             <a:endParaRPr lang="de-DE"/>
           </a:p>
@@ -1984,7 +1984,7 @@
           <a:p>
             <a:fld id="{636A27B1-28FF-9346-9954-1945AF7FD071}" type="slidenum">
               <a:rPr lang="de-DE" smtClean="0"/>
-              <a:t>‹Nr.›</a:t>
+              <a:t>‹#›</a:t>
             </a:fld>
             <a:endParaRPr lang="de-DE"/>
           </a:p>
@@ -2055,7 +2055,7 @@
           <a:p>
             <a:fld id="{EEB0755A-CF30-D146-8D26-B2A5A92CA76D}" type="datetimeFigureOut">
               <a:rPr lang="de-DE" smtClean="0"/>
-              <a:t>24.02.2017</a:t>
+              <a:t>30.04.18</a:t>
             </a:fld>
             <a:endParaRPr lang="de-DE"/>
           </a:p>
@@ -2097,7 +2097,7 @@
           <a:p>
             <a:fld id="{636A27B1-28FF-9346-9954-1945AF7FD071}" type="slidenum">
               <a:rPr lang="de-DE" smtClean="0"/>
-              <a:t>‹Nr.›</a:t>
+              <a:t>‹#›</a:t>
             </a:fld>
             <a:endParaRPr lang="de-DE"/>
           </a:p>
@@ -2145,7 +2145,7 @@
           <a:p>
             <a:fld id="{EEB0755A-CF30-D146-8D26-B2A5A92CA76D}" type="datetimeFigureOut">
               <a:rPr lang="de-DE" smtClean="0"/>
-              <a:t>24.02.2017</a:t>
+              <a:t>30.04.18</a:t>
             </a:fld>
             <a:endParaRPr lang="de-DE"/>
           </a:p>
@@ -2187,7 +2187,7 @@
           <a:p>
             <a:fld id="{636A27B1-28FF-9346-9954-1945AF7FD071}" type="slidenum">
               <a:rPr lang="de-DE" smtClean="0"/>
-              <a:t>‹Nr.›</a:t>
+              <a:t>‹#›</a:t>
             </a:fld>
             <a:endParaRPr lang="de-DE"/>
           </a:p>
@@ -2417,7 +2417,7 @@
           <a:p>
             <a:fld id="{EEB0755A-CF30-D146-8D26-B2A5A92CA76D}" type="datetimeFigureOut">
               <a:rPr lang="de-DE" smtClean="0"/>
-              <a:t>24.02.2017</a:t>
+              <a:t>30.04.18</a:t>
             </a:fld>
             <a:endParaRPr lang="de-DE"/>
           </a:p>
@@ -2459,7 +2459,7 @@
           <a:p>
             <a:fld id="{636A27B1-28FF-9346-9954-1945AF7FD071}" type="slidenum">
               <a:rPr lang="de-DE" smtClean="0"/>
-              <a:t>‹Nr.›</a:t>
+              <a:t>‹#›</a:t>
             </a:fld>
             <a:endParaRPr lang="de-DE"/>
           </a:p>
@@ -2669,7 +2669,7 @@
           <a:p>
             <a:fld id="{EEB0755A-CF30-D146-8D26-B2A5A92CA76D}" type="datetimeFigureOut">
               <a:rPr lang="de-DE" smtClean="0"/>
-              <a:t>24.02.2017</a:t>
+              <a:t>30.04.18</a:t>
             </a:fld>
             <a:endParaRPr lang="de-DE"/>
           </a:p>
@@ -2711,7 +2711,7 @@
           <a:p>
             <a:fld id="{636A27B1-28FF-9346-9954-1945AF7FD071}" type="slidenum">
               <a:rPr lang="de-DE" smtClean="0"/>
-              <a:t>‹Nr.›</a:t>
+              <a:t>‹#›</a:t>
             </a:fld>
             <a:endParaRPr lang="de-DE"/>
           </a:p>
@@ -2877,7 +2877,7 @@
           <a:p>
             <a:fld id="{EEB0755A-CF30-D146-8D26-B2A5A92CA76D}" type="datetimeFigureOut">
               <a:rPr lang="de-DE" smtClean="0"/>
-              <a:t>24.02.2017</a:t>
+              <a:t>30.04.18</a:t>
             </a:fld>
             <a:endParaRPr lang="de-DE"/>
           </a:p>
@@ -2955,7 +2955,7 @@
           <a:p>
             <a:fld id="{636A27B1-28FF-9346-9954-1945AF7FD071}" type="slidenum">
               <a:rPr lang="de-DE" smtClean="0"/>
-              <a:t>‹Nr.›</a:t>
+              <a:t>‹#›</a:t>
             </a:fld>
             <a:endParaRPr lang="de-DE"/>
           </a:p>
@@ -10515,16 +10515,7 @@
                 </a:solidFill>
                 <a:latin typeface="Monaco" charset="0"/>
               </a:rPr>
-              <a:t>.HEDGE</a:t>
-            </a:r>
-            <a:r>
-              <a:rPr lang="de-DE" sz="1000" b="1" dirty="0" smtClean="0">
-                <a:solidFill>
-                  <a:srgbClr val="000000"/>
-                </a:solidFill>
-                <a:latin typeface="Monaco" charset="0"/>
-              </a:rPr>
-              <a:t>);</a:t>
+              <a:t>.HEDGE);</a:t>
             </a:r>
           </a:p>
           <a:p>
@@ -20428,6 +20419,92 @@
           </a:fontRef>
         </p:style>
       </p:cxnSp>
+      <p:sp>
+        <p:nvSpPr>
+          <p:cNvPr id="9" name="TextBox 8"/>
+          <p:cNvSpPr txBox="1"/>
+          <p:nvPr/>
+        </p:nvSpPr>
+        <p:spPr>
+          <a:xfrm>
+            <a:off x="1520192" y="9536668"/>
+            <a:ext cx="5215980" cy="369332"/>
+          </a:xfrm>
+          <a:prstGeom prst="rect">
+            <a:avLst/>
+          </a:prstGeom>
+          <a:noFill/>
+        </p:spPr>
+        <p:txBody>
+          <a:bodyPr wrap="none" rtlCol="0">
+            <a:spAutoFit/>
+          </a:bodyPr>
+          <a:lstStyle/>
+          <a:p>
+            <a:r>
+              <a:rPr lang="de-DE" dirty="0" smtClean="0"/>
+              <a:t>Mentor-</a:t>
+            </a:r>
+            <a:r>
+              <a:rPr lang="de-DE" dirty="0" err="1" smtClean="0"/>
+              <a:t>Tip</a:t>
+            </a:r>
+            <a:r>
+              <a:rPr lang="de-DE" dirty="0" smtClean="0"/>
+              <a:t>: File </a:t>
+            </a:r>
+            <a:r>
+              <a:rPr lang="de-DE" dirty="0" err="1" smtClean="0"/>
+              <a:t>size</a:t>
+            </a:r>
+            <a:r>
+              <a:rPr lang="de-DE" dirty="0" smtClean="0"/>
+              <a:t> </a:t>
+            </a:r>
+            <a:r>
+              <a:rPr lang="de-DE" dirty="0" err="1" smtClean="0"/>
+              <a:t>should</a:t>
+            </a:r>
+            <a:r>
+              <a:rPr lang="de-DE" dirty="0" smtClean="0"/>
+              <a:t> </a:t>
+            </a:r>
+            <a:r>
+              <a:rPr lang="de-DE" dirty="0" err="1" smtClean="0"/>
+              <a:t>bel</a:t>
+            </a:r>
+            <a:r>
+              <a:rPr lang="de-DE" dirty="0"/>
+              <a:t> </a:t>
+            </a:r>
+            <a:r>
+              <a:rPr lang="de-DE" dirty="0" err="1" smtClean="0"/>
+              <a:t>less</a:t>
+            </a:r>
+            <a:r>
+              <a:rPr lang="de-DE" dirty="0" smtClean="0"/>
+              <a:t> </a:t>
+            </a:r>
+            <a:r>
+              <a:rPr lang="de-DE" dirty="0" err="1" smtClean="0"/>
+              <a:t>than</a:t>
+            </a:r>
+            <a:r>
+              <a:rPr lang="de-DE" dirty="0" smtClean="0"/>
+              <a:t> </a:t>
+            </a:r>
+            <a:r>
+              <a:rPr lang="de-DE" dirty="0" smtClean="0"/>
+              <a:t>100 </a:t>
+            </a:r>
+            <a:r>
+              <a:rPr lang="de-DE" dirty="0" smtClean="0"/>
+              <a:t>Kilobyte</a:t>
+            </a:r>
+            <a:endParaRPr lang="de-DE" dirty="0"/>
+          </a:p>
+        </p:txBody>
+      </p:sp>
     </p:spTree>
     <p:extLst>
       <p:ext uri="{BB962C8B-B14F-4D97-AF65-F5344CB8AC3E}">

</xml_diff>